<commit_message>
Fix bugs in parity example
</commit_message>
<xml_diff>
--- a/teaching/spring2025-intro-to-complexity/a2-time-space-languages.pptx
+++ b/teaching/spring2025-intro-to-complexity/a2-time-space-languages.pptx
@@ -226,7 +226,7 @@
           <a:p>
             <a:fld id="{F3AC89D9-4143-4CE6-8C54-F02D74289DBF}" type="datetimeFigureOut">
               <a:rPr lang="en-US" smtClean="0"/>
-              <a:t>3/24/2025</a:t>
+              <a:t>3/31/2025</a:t>
             </a:fld>
             <a:endParaRPr lang="en-US"/>
           </a:p>
@@ -640,7 +640,7 @@
           <a:p>
             <a:fld id="{5CB2DF79-D6C2-44B3-8742-A22E7E2B2DFC}" type="datetime1">
               <a:rPr lang="en-US" smtClean="0"/>
-              <a:t>3/24/2025</a:t>
+              <a:t>3/31/2025</a:t>
             </a:fld>
             <a:endParaRPr lang="en-US"/>
           </a:p>
@@ -852,7 +852,7 @@
           <a:p>
             <a:fld id="{36FF0D43-1401-4BC0-A39D-A766495ECF36}" type="datetime1">
               <a:rPr lang="en-US" smtClean="0"/>
-              <a:t>3/24/2025</a:t>
+              <a:t>3/31/2025</a:t>
             </a:fld>
             <a:endParaRPr lang="en-US"/>
           </a:p>
@@ -1060,7 +1060,7 @@
           <a:p>
             <a:fld id="{ABA214FD-A691-403F-8A1F-9E3EDE8FE8F0}" type="datetime1">
               <a:rPr lang="en-US" smtClean="0"/>
-              <a:t>3/24/2025</a:t>
+              <a:t>3/31/2025</a:t>
             </a:fld>
             <a:endParaRPr lang="en-US"/>
           </a:p>
@@ -1289,7 +1289,7 @@
           <a:p>
             <a:fld id="{5966C3CF-17B5-4FE7-A6C3-1E55F63BBB29}" type="datetime1">
               <a:rPr lang="en-US" smtClean="0"/>
-              <a:t>3/24/2025</a:t>
+              <a:t>3/31/2025</a:t>
             </a:fld>
             <a:endParaRPr lang="en-US"/>
           </a:p>
@@ -2014,7 +2014,7 @@
           <a:p>
             <a:fld id="{D1481A7A-1332-4B30-AF4F-8BCB3CC4E7B6}" type="datetime1">
               <a:rPr lang="en-US" smtClean="0"/>
-              <a:t>3/24/2025</a:t>
+              <a:t>3/31/2025</a:t>
             </a:fld>
             <a:endParaRPr lang="en-US"/>
           </a:p>
@@ -2279,7 +2279,7 @@
           <a:p>
             <a:fld id="{3406C27B-0845-452C-9314-A19F69723BBD}" type="datetime1">
               <a:rPr lang="en-US" smtClean="0"/>
-              <a:t>3/24/2025</a:t>
+              <a:t>3/31/2025</a:t>
             </a:fld>
             <a:endParaRPr lang="en-US"/>
           </a:p>
@@ -2691,7 +2691,7 @@
           <a:p>
             <a:fld id="{D5CBF1A3-5A5F-4792-B78C-6135637B9452}" type="datetime1">
               <a:rPr lang="en-US" smtClean="0"/>
-              <a:t>3/24/2025</a:t>
+              <a:t>3/31/2025</a:t>
             </a:fld>
             <a:endParaRPr lang="en-US"/>
           </a:p>
@@ -2832,7 +2832,7 @@
           <a:p>
             <a:fld id="{91DD9451-D3D4-4E42-BABA-51ED05BC4A7B}" type="datetime1">
               <a:rPr lang="en-US" smtClean="0"/>
-              <a:t>3/24/2025</a:t>
+              <a:t>3/31/2025</a:t>
             </a:fld>
             <a:endParaRPr lang="en-US"/>
           </a:p>
@@ -2959,7 +2959,7 @@
           <a:p>
             <a:fld id="{8B92536A-191E-4FD3-9217-AC0125948861}" type="datetime1">
               <a:rPr lang="en-US" smtClean="0"/>
-              <a:t>3/24/2025</a:t>
+              <a:t>3/31/2025</a:t>
             </a:fld>
             <a:endParaRPr lang="en-US"/>
           </a:p>
@@ -3284,7 +3284,7 @@
           <a:p>
             <a:fld id="{EBAC3400-7673-4D56-AFCD-41352542AA5B}" type="datetime1">
               <a:rPr lang="en-US" smtClean="0"/>
-              <a:t>3/24/2025</a:t>
+              <a:t>3/31/2025</a:t>
             </a:fld>
             <a:endParaRPr lang="en-US"/>
           </a:p>
@@ -3572,7 +3572,7 @@
           <a:p>
             <a:fld id="{0B76DF79-0AD1-4A96-B09E-944AF8ACECDD}" type="datetime1">
               <a:rPr lang="en-US" smtClean="0"/>
-              <a:t>3/24/2025</a:t>
+              <a:t>3/31/2025</a:t>
             </a:fld>
             <a:endParaRPr lang="en-US"/>
           </a:p>
@@ -3813,7 +3813,7 @@
           <a:p>
             <a:fld id="{D260B097-4004-4718-A94A-9D119BA8F2F4}" type="datetime1">
               <a:rPr lang="en-US" smtClean="0"/>
-              <a:t>3/24/2025</a:t>
+              <a:t>3/31/2025</a:t>
             </a:fld>
             <a:endParaRPr lang="en-US"/>
           </a:p>
@@ -5401,8 +5401,8 @@
           </a:p>
         </p:txBody>
       </p:sp>
-      <mc:AlternateContent xmlns:mc="http://schemas.openxmlformats.org/markup-compatibility/2006">
-        <mc:Choice xmlns:a14="http://schemas.microsoft.com/office/drawing/2010/main" Requires="a14">
+      <mc:AlternateContent xmlns:mc="http://schemas.openxmlformats.org/markup-compatibility/2006" xmlns:a14="http://schemas.microsoft.com/office/drawing/2010/main">
+        <mc:Choice Requires="a14">
           <p:sp>
             <p:nvSpPr>
               <p:cNvPr id="3" name="Content Placeholder 2">
@@ -6076,7 +6076,7 @@
             </p:txBody>
           </p:sp>
         </mc:Choice>
-        <mc:Fallback>
+        <mc:Fallback xmlns="">
           <p:sp>
             <p:nvSpPr>
               <p:cNvPr id="3" name="Content Placeholder 2">
@@ -15263,7 +15263,7 @@
                       <a:rPr lang="en-US" b="0" i="1" smtClean="0">
                         <a:latin typeface="Cambria Math" panose="02040503050406030204" pitchFamily="18" charset="0"/>
                       </a:rPr>
-                      <m:t>≤</m:t>
+                      <m:t>&lt;</m:t>
                     </m:r>
                     <m:r>
                       <a:rPr lang="en-US" b="0" i="1" smtClean="0">
@@ -15279,6 +15279,132 @@
                 <a:r>
                   <a:rPr lang="en-US" dirty="0"/>
                   <a:t>Consequently, </a:t>
+                </a:r>
+                <a14:m>
+                  <m:oMath xmlns:m="http://schemas.openxmlformats.org/officeDocument/2006/math">
+                    <m:sSub>
+                      <m:sSubPr>
+                        <m:ctrlPr>
+                          <a:rPr lang="en-US" b="0" i="1" smtClean="0">
+                            <a:latin typeface="Cambria Math" panose="02040503050406030204" pitchFamily="18" charset="0"/>
+                          </a:rPr>
+                        </m:ctrlPr>
+                      </m:sSubPr>
+                      <m:e>
+                        <m:r>
+                          <a:rPr lang="en-US" b="0" i="1" smtClean="0">
+                            <a:latin typeface="Cambria Math" panose="02040503050406030204" pitchFamily="18" charset="0"/>
+                          </a:rPr>
+                          <m:t>𝐶</m:t>
+                        </m:r>
+                      </m:e>
+                      <m:sub>
+                        <m:r>
+                          <a:rPr lang="en-US" b="0" i="1" smtClean="0">
+                            <a:latin typeface="Cambria Math" panose="02040503050406030204" pitchFamily="18" charset="0"/>
+                          </a:rPr>
+                          <m:t>𝑛</m:t>
+                        </m:r>
+                      </m:sub>
+                    </m:sSub>
+                    <m:r>
+                      <a:rPr lang="en-US" b="0" i="1" smtClean="0">
+                        <a:latin typeface="Cambria Math" panose="02040503050406030204" pitchFamily="18" charset="0"/>
+                      </a:rPr>
+                      <m:t>=</m:t>
+                    </m:r>
+                    <m:r>
+                      <a:rPr lang="en-US" b="0" i="1" smtClean="0">
+                        <a:latin typeface="Cambria Math" panose="02040503050406030204" pitchFamily="18" charset="0"/>
+                      </a:rPr>
+                      <m:t>𝑤</m:t>
+                    </m:r>
+                    <m:sSub>
+                      <m:sSubPr>
+                        <m:ctrlPr>
+                          <a:rPr lang="en-US" b="0" i="1" smtClean="0">
+                            <a:latin typeface="Cambria Math" panose="02040503050406030204" pitchFamily="18" charset="0"/>
+                          </a:rPr>
+                        </m:ctrlPr>
+                      </m:sSubPr>
+                      <m:e>
+                        <m:r>
+                          <a:rPr lang="en-US" b="0" i="1" smtClean="0">
+                            <a:latin typeface="Cambria Math" panose="02040503050406030204" pitchFamily="18" charset="0"/>
+                          </a:rPr>
+                          <m:t>𝑞</m:t>
+                        </m:r>
+                      </m:e>
+                      <m:sub>
+                        <m:sSub>
+                          <m:sSubPr>
+                            <m:ctrlPr>
+                              <a:rPr lang="en-US" b="0" i="1" smtClean="0">
+                                <a:latin typeface="Cambria Math" panose="02040503050406030204" pitchFamily="18" charset="0"/>
+                              </a:rPr>
+                            </m:ctrlPr>
+                          </m:sSubPr>
+                          <m:e>
+                            <m:r>
+                              <a:rPr lang="en-US" b="0" i="1" smtClean="0">
+                                <a:latin typeface="Cambria Math" panose="02040503050406030204" pitchFamily="18" charset="0"/>
+                              </a:rPr>
+                              <m:t>𝑤</m:t>
+                            </m:r>
+                          </m:e>
+                          <m:sub>
+                            <m:r>
+                              <a:rPr lang="en-US" b="0" i="1" smtClean="0">
+                                <a:latin typeface="Cambria Math" panose="02040503050406030204" pitchFamily="18" charset="0"/>
+                              </a:rPr>
+                              <m:t>1</m:t>
+                            </m:r>
+                          </m:sub>
+                        </m:sSub>
+                        <m:r>
+                          <a:rPr lang="en-US" b="0" i="1" smtClean="0">
+                            <a:latin typeface="Cambria Math" panose="02040503050406030204" pitchFamily="18" charset="0"/>
+                          </a:rPr>
+                          <m:t>+…+</m:t>
+                        </m:r>
+                        <m:sSub>
+                          <m:sSubPr>
+                            <m:ctrlPr>
+                              <a:rPr lang="en-US" b="0" i="1" smtClean="0">
+                                <a:latin typeface="Cambria Math" panose="02040503050406030204" pitchFamily="18" charset="0"/>
+                              </a:rPr>
+                            </m:ctrlPr>
+                          </m:sSubPr>
+                          <m:e>
+                            <m:r>
+                              <a:rPr lang="en-US" b="0" i="1" smtClean="0">
+                                <a:latin typeface="Cambria Math" panose="02040503050406030204" pitchFamily="18" charset="0"/>
+                              </a:rPr>
+                              <m:t>𝑤</m:t>
+                            </m:r>
+                          </m:e>
+                          <m:sub>
+                            <m:r>
+                              <a:rPr lang="en-US" b="0" i="1" smtClean="0">
+                                <a:latin typeface="Cambria Math" panose="02040503050406030204" pitchFamily="18" charset="0"/>
+                              </a:rPr>
+                              <m:t>𝑖</m:t>
+                            </m:r>
+                          </m:sub>
+                        </m:sSub>
+                      </m:sub>
+                    </m:sSub>
+                    <m:r>
+                      <a:rPr lang="en-US" b="0" i="1" smtClean="0">
+                        <a:latin typeface="Cambria Math" panose="02040503050406030204" pitchFamily="18" charset="0"/>
+                      </a:rPr>
+                      <m:t>⊔</m:t>
+                    </m:r>
+                  </m:oMath>
+                </a14:m>
+                <a:r>
+                  <a:rPr lang="en-US" dirty="0"/>
+                  <a:t> and </a:t>
                 </a:r>
                 <a14:m>
                   <m:oMath xmlns:m="http://schemas.openxmlformats.org/officeDocument/2006/math">
@@ -15406,6 +15532,12 @@
                         </m:sSub>
                       </m:sub>
                     </m:sSub>
+                    <m:r>
+                      <a:rPr lang="en-US" b="0" i="1" smtClean="0">
+                        <a:latin typeface="Cambria Math" panose="02040503050406030204" pitchFamily="18" charset="0"/>
+                      </a:rPr>
+                      <m:t>⊔</m:t>
+                    </m:r>
                   </m:oMath>
                 </a14:m>
                 <a:endParaRPr lang="en-US" dirty="0"/>
@@ -15438,7 +15570,7 @@
               <a:blipFill>
                 <a:blip r:embed="rId3"/>
                 <a:stretch>
-                  <a:fillRect l="-812" b="-2083"/>
+                  <a:fillRect l="-812" b="-2206"/>
                 </a:stretch>
               </a:blipFill>
             </p:spPr>
@@ -33718,8 +33850,8 @@
           </a:p>
         </p:txBody>
       </p:sp>
-      <mc:AlternateContent xmlns:mc="http://schemas.openxmlformats.org/markup-compatibility/2006">
-        <mc:Choice xmlns:a14="http://schemas.microsoft.com/office/drawing/2010/main" Requires="a14">
+      <mc:AlternateContent xmlns:mc="http://schemas.openxmlformats.org/markup-compatibility/2006" xmlns:a14="http://schemas.microsoft.com/office/drawing/2010/main">
+        <mc:Choice Requires="a14">
           <p:sp>
             <p:nvSpPr>
               <p:cNvPr id="3" name="Content Placeholder 2">
@@ -34217,7 +34349,7 @@
             </p:txBody>
           </p:sp>
         </mc:Choice>
-        <mc:Fallback>
+        <mc:Fallback xmlns="">
           <p:sp>
             <p:nvSpPr>
               <p:cNvPr id="3" name="Content Placeholder 2">
@@ -37443,8 +37575,8 @@
           </a:p>
         </p:txBody>
       </p:sp>
-      <mc:AlternateContent xmlns:mc="http://schemas.openxmlformats.org/markup-compatibility/2006">
-        <mc:Choice xmlns:a14="http://schemas.microsoft.com/office/drawing/2010/main" Requires="a14">
+      <mc:AlternateContent xmlns:mc="http://schemas.openxmlformats.org/markup-compatibility/2006" xmlns:a14="http://schemas.microsoft.com/office/drawing/2010/main">
+        <mc:Choice Requires="a14">
           <p:sp>
             <p:nvSpPr>
               <p:cNvPr id="3" name="Content Placeholder 2">
@@ -39100,7 +39232,7 @@
             </p:txBody>
           </p:sp>
         </mc:Choice>
-        <mc:Fallback>
+        <mc:Fallback xmlns="">
           <p:sp>
             <p:nvSpPr>
               <p:cNvPr id="3" name="Content Placeholder 2">

</xml_diff>